<commit_message>
Adding slides to visualize the live reload
</commit_message>
<xml_diff>
--- a/generic-docker-node-reload.pptx
+++ b/generic-docker-node-reload.pptx
@@ -6,6 +6,7 @@
   </p:sldMasterIdLst>
   <p:sldIdLst>
     <p:sldId id="631" r:id="rId2"/>
+    <p:sldId id="632" r:id="rId3"/>
   </p:sldIdLst>
   <p:sldSz cx="12192000" cy="6858000"/>
   <p:notesSz cx="6858000" cy="9144000"/>
@@ -104,6 +105,11 @@
       </a:defRPr>
     </a:lvl9pPr>
   </p:defaultTextStyle>
+  <p:extLst>
+    <p:ext uri="{EFAFB233-063F-42B5-8137-9DF3F51BA10A}">
+      <p15:sldGuideLst xmlns:p15="http://schemas.microsoft.com/office/powerpoint/2012/main"/>
+    </p:ext>
+  </p:extLst>
 </p:presentation>
 </file>
 
@@ -256,7 +262,7 @@
           <a:p>
             <a:fld id="{0F8A6689-D49B-477E-94E2-091A19403C12}" type="datetimeFigureOut">
               <a:rPr lang="en-NL" smtClean="0"/>
-              <a:t>22/09/2018</a:t>
+              <a:t>23/09/2018</a:t>
             </a:fld>
             <a:endParaRPr lang="en-NL"/>
           </a:p>
@@ -456,7 +462,7 @@
           <a:p>
             <a:fld id="{0F8A6689-D49B-477E-94E2-091A19403C12}" type="datetimeFigureOut">
               <a:rPr lang="en-NL" smtClean="0"/>
-              <a:t>22/09/2018</a:t>
+              <a:t>23/09/2018</a:t>
             </a:fld>
             <a:endParaRPr lang="en-NL"/>
           </a:p>
@@ -666,7 +672,7 @@
           <a:p>
             <a:fld id="{0F8A6689-D49B-477E-94E2-091A19403C12}" type="datetimeFigureOut">
               <a:rPr lang="en-NL" smtClean="0"/>
-              <a:t>22/09/2018</a:t>
+              <a:t>23/09/2018</a:t>
             </a:fld>
             <a:endParaRPr lang="en-NL"/>
           </a:p>
@@ -1017,7 +1023,7 @@
           <a:p>
             <a:fld id="{0F8A6689-D49B-477E-94E2-091A19403C12}" type="datetimeFigureOut">
               <a:rPr lang="en-NL" smtClean="0"/>
-              <a:t>22/09/2018</a:t>
+              <a:t>23/09/2018</a:t>
             </a:fld>
             <a:endParaRPr lang="en-NL"/>
           </a:p>
@@ -1293,7 +1299,7 @@
           <a:p>
             <a:fld id="{0F8A6689-D49B-477E-94E2-091A19403C12}" type="datetimeFigureOut">
               <a:rPr lang="en-NL" smtClean="0"/>
-              <a:t>22/09/2018</a:t>
+              <a:t>23/09/2018</a:t>
             </a:fld>
             <a:endParaRPr lang="en-NL"/>
           </a:p>
@@ -1561,7 +1567,7 @@
           <a:p>
             <a:fld id="{0F8A6689-D49B-477E-94E2-091A19403C12}" type="datetimeFigureOut">
               <a:rPr lang="en-NL" smtClean="0"/>
-              <a:t>22/09/2018</a:t>
+              <a:t>23/09/2018</a:t>
             </a:fld>
             <a:endParaRPr lang="en-NL"/>
           </a:p>
@@ -1976,7 +1982,7 @@
           <a:p>
             <a:fld id="{0F8A6689-D49B-477E-94E2-091A19403C12}" type="datetimeFigureOut">
               <a:rPr lang="en-NL" smtClean="0"/>
-              <a:t>22/09/2018</a:t>
+              <a:t>23/09/2018</a:t>
             </a:fld>
             <a:endParaRPr lang="en-NL"/>
           </a:p>
@@ -2118,7 +2124,7 @@
           <a:p>
             <a:fld id="{0F8A6689-D49B-477E-94E2-091A19403C12}" type="datetimeFigureOut">
               <a:rPr lang="en-NL" smtClean="0"/>
-              <a:t>22/09/2018</a:t>
+              <a:t>23/09/2018</a:t>
             </a:fld>
             <a:endParaRPr lang="en-NL"/>
           </a:p>
@@ -2231,7 +2237,7 @@
           <a:p>
             <a:fld id="{0F8A6689-D49B-477E-94E2-091A19403C12}" type="datetimeFigureOut">
               <a:rPr lang="en-NL" smtClean="0"/>
-              <a:t>22/09/2018</a:t>
+              <a:t>23/09/2018</a:t>
             </a:fld>
             <a:endParaRPr lang="en-NL"/>
           </a:p>
@@ -2544,7 +2550,7 @@
           <a:p>
             <a:fld id="{0F8A6689-D49B-477E-94E2-091A19403C12}" type="datetimeFigureOut">
               <a:rPr lang="en-NL" smtClean="0"/>
-              <a:t>22/09/2018</a:t>
+              <a:t>23/09/2018</a:t>
             </a:fld>
             <a:endParaRPr lang="en-NL"/>
           </a:p>
@@ -2833,7 +2839,7 @@
           <a:p>
             <a:fld id="{0F8A6689-D49B-477E-94E2-091A19403C12}" type="datetimeFigureOut">
               <a:rPr lang="en-NL" smtClean="0"/>
-              <a:t>22/09/2018</a:t>
+              <a:t>23/09/2018</a:t>
             </a:fld>
             <a:endParaRPr lang="en-NL"/>
           </a:p>
@@ -3076,7 +3082,7 @@
           <a:p>
             <a:fld id="{0F8A6689-D49B-477E-94E2-091A19403C12}" type="datetimeFigureOut">
               <a:rPr lang="en-NL" smtClean="0"/>
-              <a:t>22/09/2018</a:t>
+              <a:t>23/09/2018</a:t>
             </a:fld>
             <a:endParaRPr lang="en-NL"/>
           </a:p>
@@ -3517,7 +3523,7 @@
         </p:blipFill>
         <p:spPr bwMode="auto">
           <a:xfrm>
-            <a:off x="9037647" y="5664868"/>
+            <a:off x="6290047" y="5248877"/>
             <a:ext cx="1853969" cy="717702"/>
           </a:xfrm>
           <a:prstGeom prst="rect">
@@ -3571,7 +3577,7 @@
         </p:blipFill>
         <p:spPr bwMode="auto">
           <a:xfrm>
-            <a:off x="7720077" y="3225290"/>
+            <a:off x="6635901" y="3301446"/>
             <a:ext cx="2543824" cy="1979095"/>
           </a:xfrm>
           <a:prstGeom prst="rect">
@@ -3612,7 +3618,7 @@
         </p:blipFill>
         <p:spPr bwMode="auto">
           <a:xfrm rot="756691">
-            <a:off x="8186845" y="4192248"/>
+            <a:off x="7102669" y="4268404"/>
             <a:ext cx="1133952" cy="566976"/>
           </a:xfrm>
           <a:prstGeom prst="rect">
@@ -3653,7 +3659,7 @@
         </p:blipFill>
         <p:spPr bwMode="auto">
           <a:xfrm>
-            <a:off x="8861161" y="3932980"/>
+            <a:off x="7776985" y="4009136"/>
             <a:ext cx="352725" cy="406778"/>
           </a:xfrm>
           <a:prstGeom prst="rect">
@@ -3702,7 +3708,7 @@
         </p:nvSpPr>
         <p:spPr>
           <a:xfrm>
-            <a:off x="687475" y="593144"/>
+            <a:off x="0" y="12383"/>
             <a:ext cx="10137210" cy="946580"/>
           </a:xfrm>
         </p:spPr>
@@ -4053,7 +4059,7 @@
         </p:blipFill>
         <p:spPr bwMode="auto">
           <a:xfrm>
-            <a:off x="937979" y="4472038"/>
+            <a:off x="-2958" y="4550128"/>
             <a:ext cx="2294079" cy="1898350"/>
           </a:xfrm>
           <a:prstGeom prst="rect">
@@ -4218,7 +4224,7 @@
         </p:blipFill>
         <p:spPr bwMode="auto">
           <a:xfrm>
-            <a:off x="3270928" y="2862343"/>
+            <a:off x="2186752" y="2938499"/>
             <a:ext cx="2543824" cy="1979095"/>
           </a:xfrm>
           <a:prstGeom prst="rect">
@@ -4259,7 +4265,7 @@
         </p:blipFill>
         <p:spPr bwMode="auto">
           <a:xfrm rot="756691">
-            <a:off x="3737695" y="3829301"/>
+            <a:off x="2653519" y="3905457"/>
             <a:ext cx="1133952" cy="566976"/>
           </a:xfrm>
           <a:prstGeom prst="rect">
@@ -4300,7 +4306,7 @@
         </p:blipFill>
         <p:spPr bwMode="auto">
           <a:xfrm>
-            <a:off x="4412012" y="3570033"/>
+            <a:off x="3327836" y="3646189"/>
             <a:ext cx="352725" cy="406778"/>
           </a:xfrm>
           <a:prstGeom prst="rect">
@@ -4340,13 +4346,15 @@
       <p:cxnSp>
         <p:nvCxnSpPr>
           <p:cNvPr id="9" name="Straight Arrow Connector 8"/>
-          <p:cNvCxnSpPr/>
+          <p:cNvCxnSpPr>
+            <a:cxnSpLocks/>
+          </p:cNvCxnSpPr>
           <p:nvPr/>
         </p:nvCxnSpPr>
         <p:spPr>
           <a:xfrm flipV="1">
-            <a:off x="2486842" y="4318370"/>
-            <a:ext cx="1317089" cy="417897"/>
+            <a:off x="1996207" y="4394527"/>
+            <a:ext cx="723548" cy="557807"/>
           </a:xfrm>
           <a:prstGeom prst="straightConnector1">
             <a:avLst/>
@@ -4378,8 +4386,8 @@
         </p:nvSpPr>
         <p:spPr>
           <a:xfrm>
-            <a:off x="410753" y="4167413"/>
-            <a:ext cx="2278381" cy="287130"/>
+            <a:off x="-27694" y="4176062"/>
+            <a:ext cx="2716256" cy="287130"/>
           </a:xfrm>
           <a:prstGeom prst="rect">
             <a:avLst/>
@@ -4394,7 +4402,7 @@
           <a:p>
             <a:r>
               <a:rPr lang="nl-NL" sz="1266" dirty="0"/>
-              <a:t>1. pull </a:t>
+              <a:t>1. pull image </a:t>
             </a:r>
             <a:r>
               <a:rPr lang="nl-NL" sz="1266" dirty="0" err="1"/>
@@ -4420,7 +4428,7 @@
         </p:nvGrpSpPr>
         <p:grpSpPr>
           <a:xfrm>
-            <a:off x="7152166" y="1469354"/>
+            <a:off x="6067990" y="1545510"/>
             <a:ext cx="3345555" cy="1392989"/>
             <a:chOff x="7296572" y="2958085"/>
             <a:chExt cx="8339668" cy="3595115"/>
@@ -4576,7 +4584,7 @@
         </p:nvSpPr>
         <p:spPr>
           <a:xfrm>
-            <a:off x="5678063" y="3600828"/>
+            <a:off x="4593887" y="3676984"/>
             <a:ext cx="1870570" cy="1023920"/>
           </a:xfrm>
           <a:prstGeom prst="rightArrow">
@@ -4622,7 +4630,7 @@
         </p:nvCxnSpPr>
         <p:spPr>
           <a:xfrm>
-            <a:off x="7895465" y="2630836"/>
+            <a:off x="6811289" y="2706992"/>
             <a:ext cx="483899" cy="1252671"/>
           </a:xfrm>
           <a:prstGeom prst="straightConnector1">
@@ -4655,8 +4663,8 @@
         </p:nvSpPr>
         <p:spPr>
           <a:xfrm>
-            <a:off x="8090078" y="3089779"/>
-            <a:ext cx="1557414" cy="287130"/>
+            <a:off x="5146615" y="2893886"/>
+            <a:ext cx="1842749" cy="287130"/>
           </a:xfrm>
           <a:prstGeom prst="rect">
             <a:avLst/>
@@ -4679,7 +4687,7 @@
             </a:r>
             <a:r>
               <a:rPr lang="nl-NL" sz="1266" dirty="0"/>
-              <a:t> </a:t>
+              <a:t> app </a:t>
             </a:r>
             <a:r>
               <a:rPr lang="nl-NL" sz="1266" dirty="0" err="1"/>
@@ -4701,8 +4709,8 @@
         </p:nvSpPr>
         <p:spPr>
           <a:xfrm>
-            <a:off x="5678063" y="4400728"/>
-            <a:ext cx="1482585" cy="1261114"/>
+            <a:off x="4593887" y="4476884"/>
+            <a:ext cx="1535613" cy="871521"/>
           </a:xfrm>
           <a:prstGeom prst="rect">
             <a:avLst/>
@@ -4725,14 +4733,83 @@
             </a:r>
           </a:p>
           <a:p>
+            <a:r>
+              <a:rPr lang="nl-NL" sz="1266" dirty="0"/>
+              <a:t>- GITHUB_URL</a:t>
+            </a:r>
+          </a:p>
+          <a:p>
+            <a:r>
+              <a:rPr lang="nl-NL" sz="1266" dirty="0"/>
+              <a:t>- </a:t>
+            </a:r>
+            <a:r>
+              <a:rPr lang="nl-NL" sz="1266" dirty="0" err="1"/>
+              <a:t>Other</a:t>
+            </a:r>
+            <a:r>
+              <a:rPr lang="nl-NL" sz="1266" dirty="0"/>
+              <a:t> environment</a:t>
+            </a:r>
+            <a:br>
+              <a:rPr lang="nl-NL" sz="1266" dirty="0"/>
+            </a:br>
+            <a:r>
+              <a:rPr lang="nl-NL" sz="1266" dirty="0"/>
+              <a:t>  variables</a:t>
+            </a:r>
+          </a:p>
+        </p:txBody>
+      </p:sp>
+      <p:sp>
+        <p:nvSpPr>
+          <p:cNvPr id="45" name="TextBox 44"/>
+          <p:cNvSpPr txBox="1"/>
+          <p:nvPr/>
+        </p:nvSpPr>
+        <p:spPr>
+          <a:xfrm>
+            <a:off x="4541823" y="3297106"/>
+            <a:ext cx="1322798" cy="676724"/>
+          </a:xfrm>
+          <a:prstGeom prst="rect">
+            <a:avLst/>
+          </a:prstGeom>
+          <a:noFill/>
+        </p:spPr>
+        <p:txBody>
+          <a:bodyPr wrap="none" rtlCol="0">
+            <a:spAutoFit/>
+          </a:bodyPr>
+          <a:lstStyle/>
+          <a:p>
+            <a:r>
+              <a:rPr lang="nl-NL" sz="1266" dirty="0"/>
+              <a:t>2. </a:t>
+            </a:r>
+            <a:r>
+              <a:rPr lang="nl-NL" sz="1266" dirty="0" err="1"/>
+              <a:t>docker</a:t>
+            </a:r>
+            <a:r>
+              <a:rPr lang="nl-NL" sz="1266" dirty="0"/>
+              <a:t> run:</a:t>
+            </a:r>
+          </a:p>
+          <a:p>
             <a:pPr marL="241093" indent="-241093">
               <a:buFontTx/>
               <a:buChar char="-"/>
             </a:pPr>
             <a:r>
               <a:rPr lang="nl-NL" sz="1266" dirty="0"/>
-              <a:t>GITHUB_URL</a:t>
-            </a:r>
+              <a:t>port </a:t>
+            </a:r>
+            <a:r>
+              <a:rPr lang="nl-NL" sz="1266" dirty="0" err="1"/>
+              <a:t>mapping</a:t>
+            </a:r>
+            <a:endParaRPr lang="nl-NL" sz="1266" dirty="0"/>
           </a:p>
           <a:p>
             <a:pPr marL="241093" indent="-241093">
@@ -4741,52 +4818,21 @@
             </a:pPr>
             <a:r>
               <a:rPr lang="nl-NL" sz="1266" dirty="0"/>
-              <a:t>APP_HOME</a:t>
-            </a:r>
-          </a:p>
-          <a:p>
-            <a:pPr marL="241093" indent="-241093">
-              <a:buFontTx/>
-              <a:buChar char="-"/>
-            </a:pPr>
-            <a:r>
-              <a:rPr lang="nl-NL" sz="1266" dirty="0"/>
-              <a:t>APP_STARTUP</a:t>
-            </a:r>
-          </a:p>
-          <a:p>
-            <a:pPr marL="241093" indent="-241093">
-              <a:buFontTx/>
-              <a:buChar char="-"/>
-            </a:pPr>
-            <a:r>
-              <a:rPr lang="nl-NL" sz="1266" dirty="0"/>
-              <a:t>APP_PORT</a:t>
-            </a:r>
-          </a:p>
-          <a:p>
-            <a:pPr marL="241093" indent="-241093">
-              <a:buFontTx/>
-              <a:buChar char="-"/>
-            </a:pPr>
-            <a:r>
-              <a:rPr lang="nl-NL" sz="1266" dirty="0"/>
-              <a:t>NODE_VERSION</a:t>
-            </a:r>
-            <a:endParaRPr lang="en-US" sz="1266" dirty="0" err="1"/>
-          </a:p>
-        </p:txBody>
-      </p:sp>
-      <p:sp>
-        <p:nvSpPr>
-          <p:cNvPr id="45" name="TextBox 44"/>
+              <a:t>volume</a:t>
+            </a:r>
+          </a:p>
+        </p:txBody>
+      </p:sp>
+      <p:sp>
+        <p:nvSpPr>
+          <p:cNvPr id="46" name="TextBox 45"/>
           <p:cNvSpPr txBox="1"/>
           <p:nvPr/>
         </p:nvSpPr>
         <p:spPr>
           <a:xfrm>
-            <a:off x="5678063" y="3039551"/>
-            <a:ext cx="1322798" cy="676724"/>
+            <a:off x="8880456" y="4113781"/>
+            <a:ext cx="3375476" cy="287130"/>
           </a:xfrm>
           <a:prstGeom prst="rect">
             <a:avLst/>
@@ -4801,54 +4847,58 @@
           <a:p>
             <a:r>
               <a:rPr lang="nl-NL" sz="1266" dirty="0"/>
-              <a:t>2. </a:t>
+              <a:t>4. </a:t>
             </a:r>
             <a:r>
               <a:rPr lang="nl-NL" sz="1266" dirty="0" err="1"/>
-              <a:t>docker</a:t>
+              <a:t>npm</a:t>
             </a:r>
             <a:r>
               <a:rPr lang="nl-NL" sz="1266" dirty="0"/>
-              <a:t> run:</a:t>
-            </a:r>
-          </a:p>
-          <a:p>
-            <a:pPr marL="241093" indent="-241093">
-              <a:buFontTx/>
-              <a:buChar char="-"/>
-            </a:pPr>
+              <a:t> </a:t>
+            </a:r>
+            <a:r>
+              <a:rPr lang="nl-NL" sz="1266" dirty="0" err="1"/>
+              <a:t>install</a:t>
+            </a:r>
             <a:r>
               <a:rPr lang="nl-NL" sz="1266" dirty="0"/>
-              <a:t>port </a:t>
+              <a:t> // </a:t>
             </a:r>
             <a:r>
               <a:rPr lang="nl-NL" sz="1266" dirty="0" err="1"/>
-              <a:t>mapping</a:t>
-            </a:r>
-            <a:endParaRPr lang="nl-NL" sz="1266" dirty="0"/>
-          </a:p>
-          <a:p>
-            <a:pPr marL="241093" indent="-241093">
-              <a:buFontTx/>
-              <a:buChar char="-"/>
-            </a:pPr>
+              <a:t>install</a:t>
+            </a:r>
             <a:r>
               <a:rPr lang="nl-NL" sz="1266" dirty="0"/>
-              <a:t>volume</a:t>
-            </a:r>
-          </a:p>
-        </p:txBody>
-      </p:sp>
-      <p:sp>
-        <p:nvSpPr>
-          <p:cNvPr id="46" name="TextBox 45"/>
+              <a:t> </a:t>
+            </a:r>
+            <a:r>
+              <a:rPr lang="nl-NL" sz="1266" dirty="0" err="1"/>
+              <a:t>application</a:t>
+            </a:r>
+            <a:r>
+              <a:rPr lang="nl-NL" sz="1266" dirty="0"/>
+              <a:t> </a:t>
+            </a:r>
+            <a:r>
+              <a:rPr lang="nl-NL" sz="1266" dirty="0" err="1"/>
+              <a:t>dependencies</a:t>
+            </a:r>
+            <a:endParaRPr lang="en-US" sz="1266" dirty="0" err="1"/>
+          </a:p>
+        </p:txBody>
+      </p:sp>
+      <p:sp>
+        <p:nvSpPr>
+          <p:cNvPr id="48" name="TextBox 47"/>
           <p:cNvSpPr txBox="1"/>
           <p:nvPr/>
         </p:nvSpPr>
         <p:spPr>
           <a:xfrm>
-            <a:off x="9964632" y="4037625"/>
-            <a:ext cx="1070549" cy="287130"/>
+            <a:off x="8805624" y="4559487"/>
+            <a:ext cx="3090911" cy="287130"/>
           </a:xfrm>
           <a:prstGeom prst="rect">
             <a:avLst/>
@@ -4863,64 +4913,31 @@
           <a:p>
             <a:r>
               <a:rPr lang="nl-NL" sz="1266" dirty="0"/>
-              <a:t>4. </a:t>
+              <a:t>5. </a:t>
             </a:r>
             <a:r>
               <a:rPr lang="nl-NL" sz="1266" dirty="0" err="1"/>
-              <a:t>npm</a:t>
+              <a:t>Nodemon</a:t>
             </a:r>
             <a:r>
               <a:rPr lang="nl-NL" sz="1266" dirty="0"/>
-              <a:t> </a:t>
+              <a:t> //</a:t>
             </a:r>
             <a:r>
               <a:rPr lang="nl-NL" sz="1266" dirty="0" err="1"/>
-              <a:t>install</a:t>
-            </a:r>
-            <a:endParaRPr lang="en-US" sz="1266" dirty="0" err="1"/>
-          </a:p>
-        </p:txBody>
-      </p:sp>
-      <p:sp>
-        <p:nvSpPr>
-          <p:cNvPr id="48" name="TextBox 47"/>
-          <p:cNvSpPr txBox="1"/>
-          <p:nvPr/>
-        </p:nvSpPr>
-        <p:spPr>
-          <a:xfrm>
-            <a:off x="9889800" y="4483331"/>
-            <a:ext cx="1163524" cy="481927"/>
-          </a:xfrm>
-          <a:prstGeom prst="rect">
-            <a:avLst/>
-          </a:prstGeom>
-          <a:noFill/>
-        </p:spPr>
-        <p:txBody>
-          <a:bodyPr wrap="none" rtlCol="0">
-            <a:spAutoFit/>
-          </a:bodyPr>
-          <a:lstStyle/>
-          <a:p>
+              <a:t>to</a:t>
+            </a:r>
             <a:r>
               <a:rPr lang="nl-NL" sz="1266" dirty="0"/>
-              <a:t>5. </a:t>
+              <a:t> run </a:t>
             </a:r>
             <a:r>
               <a:rPr lang="nl-NL" sz="1266" dirty="0" err="1"/>
-              <a:t>npm</a:t>
+              <a:t>and</a:t>
             </a:r>
             <a:r>
               <a:rPr lang="nl-NL" sz="1266" dirty="0"/>
-              <a:t> start or</a:t>
-            </a:r>
-            <a:br>
-              <a:rPr lang="nl-NL" sz="1266" dirty="0"/>
-            </a:br>
-            <a:r>
-              <a:rPr lang="nl-NL" sz="1266" dirty="0"/>
-              <a:t>node app.js</a:t>
+              <a:t> monitor Node app</a:t>
             </a:r>
             <a:endParaRPr lang="en-US" sz="1266" dirty="0" err="1"/>
           </a:p>
@@ -4949,8 +4966,8 @@
         </p:blipFill>
         <p:spPr bwMode="auto">
           <a:xfrm>
-            <a:off x="10296047" y="3268788"/>
-            <a:ext cx="1769032" cy="688882"/>
+            <a:off x="9211871" y="3344944"/>
+            <a:ext cx="1323558" cy="515409"/>
           </a:xfrm>
           <a:prstGeom prst="rect">
             <a:avLst/>
@@ -4975,7 +4992,7 @@
         </p:nvCxnSpPr>
         <p:spPr>
           <a:xfrm flipH="1">
-            <a:off x="9996778" y="3626339"/>
+            <a:off x="8912602" y="3702495"/>
             <a:ext cx="299269" cy="240989"/>
           </a:xfrm>
           <a:prstGeom prst="straightConnector1">
@@ -5023,7 +5040,7 @@
         </p:blipFill>
         <p:spPr bwMode="auto">
           <a:xfrm>
-            <a:off x="8677475" y="5462752"/>
+            <a:off x="6131237" y="5019727"/>
             <a:ext cx="629027" cy="629027"/>
           </a:xfrm>
           <a:prstGeom prst="rect">
@@ -5044,13 +5061,15 @@
       <p:cxnSp>
         <p:nvCxnSpPr>
           <p:cNvPr id="54" name="Straight Arrow Connector 53"/>
-          <p:cNvCxnSpPr/>
+          <p:cNvCxnSpPr>
+            <a:cxnSpLocks/>
+          </p:cNvCxnSpPr>
           <p:nvPr/>
         </p:nvCxnSpPr>
         <p:spPr>
-          <a:xfrm flipH="1" flipV="1">
-            <a:off x="9037646" y="4527318"/>
-            <a:ext cx="745421" cy="1496401"/>
+          <a:xfrm flipV="1">
+            <a:off x="7217031" y="4603476"/>
+            <a:ext cx="736440" cy="1004252"/>
           </a:xfrm>
           <a:prstGeom prst="straightConnector1">
             <a:avLst/>
@@ -5082,7 +5101,7 @@
         </p:nvSpPr>
         <p:spPr>
           <a:xfrm>
-            <a:off x="9597204" y="5300453"/>
+            <a:off x="6135152" y="4802336"/>
             <a:ext cx="1534779" cy="287130"/>
           </a:xfrm>
           <a:prstGeom prst="rect">
@@ -5108,10 +5127,1776 @@
           </a:p>
         </p:txBody>
       </p:sp>
+      <p:sp>
+        <p:nvSpPr>
+          <p:cNvPr id="10" name="Speech Bubble: Rectangle 9">
+            <a:extLst>
+              <a:ext uri="{FF2B5EF4-FFF2-40B4-BE49-F238E27FC236}">
+                <a16:creationId xmlns:a16="http://schemas.microsoft.com/office/drawing/2014/main" id="{D65DE4BF-EA6A-438C-B5A6-88D552728CCB}"/>
+              </a:ext>
+            </a:extLst>
+          </p:cNvPr>
+          <p:cNvSpPr/>
+          <p:nvPr/>
+        </p:nvSpPr>
+        <p:spPr>
+          <a:xfrm>
+            <a:off x="1101322" y="1888967"/>
+            <a:ext cx="1580536" cy="1198274"/>
+          </a:xfrm>
+          <a:prstGeom prst="wedgeRectCallout">
+            <a:avLst>
+              <a:gd name="adj1" fmla="val 58020"/>
+              <a:gd name="adj2" fmla="val 89677"/>
+            </a:avLst>
+          </a:prstGeom>
+        </p:spPr>
+        <p:style>
+          <a:lnRef idx="2">
+            <a:schemeClr val="accent1">
+              <a:shade val="50000"/>
+            </a:schemeClr>
+          </a:lnRef>
+          <a:fillRef idx="1">
+            <a:schemeClr val="accent1"/>
+          </a:fillRef>
+          <a:effectRef idx="0">
+            <a:schemeClr val="accent1"/>
+          </a:effectRef>
+          <a:fontRef idx="minor">
+            <a:schemeClr val="lt1"/>
+          </a:fontRef>
+        </p:style>
+        <p:txBody>
+          <a:bodyPr rtlCol="0" anchor="ctr"/>
+          <a:lstStyle/>
+          <a:p>
+            <a:r>
+              <a:rPr lang="nl-NL" sz="1400" dirty="0"/>
+              <a:t>Node 8</a:t>
+            </a:r>
+          </a:p>
+          <a:p>
+            <a:r>
+              <a:rPr lang="nl-NL" sz="1400" dirty="0" err="1"/>
+              <a:t>npm</a:t>
+            </a:r>
+            <a:endParaRPr lang="nl-NL" sz="1400" dirty="0"/>
+          </a:p>
+          <a:p>
+            <a:r>
+              <a:rPr lang="nl-NL" sz="1400" dirty="0"/>
+              <a:t>git </a:t>
+            </a:r>
+            <a:r>
+              <a:rPr lang="nl-NL" sz="1400" dirty="0" err="1"/>
+              <a:t>client</a:t>
+            </a:r>
+            <a:endParaRPr lang="nl-NL" sz="1400" dirty="0"/>
+          </a:p>
+          <a:p>
+            <a:r>
+              <a:rPr lang="nl-NL" sz="1400" dirty="0" err="1"/>
+              <a:t>nodemon</a:t>
+            </a:r>
+            <a:endParaRPr lang="nl-NL" sz="1400" dirty="0"/>
+          </a:p>
+          <a:p>
+            <a:r>
+              <a:rPr lang="nl-NL" sz="1400" dirty="0"/>
+              <a:t>node </a:t>
+            </a:r>
+            <a:r>
+              <a:rPr lang="nl-NL" sz="1400" dirty="0" err="1"/>
+              <a:t>reload</a:t>
+            </a:r>
+            <a:r>
+              <a:rPr lang="nl-NL" sz="1400" dirty="0"/>
+              <a:t> app</a:t>
+            </a:r>
+            <a:endParaRPr lang="en-NL" sz="1400" dirty="0"/>
+          </a:p>
+        </p:txBody>
+      </p:sp>
+      <p:sp>
+        <p:nvSpPr>
+          <p:cNvPr id="43" name="TextBox 42">
+            <a:extLst>
+              <a:ext uri="{FF2B5EF4-FFF2-40B4-BE49-F238E27FC236}">
+                <a16:creationId xmlns:a16="http://schemas.microsoft.com/office/drawing/2014/main" id="{72C71A11-2221-4503-8FE3-29F4D2F7B330}"/>
+              </a:ext>
+            </a:extLst>
+          </p:cNvPr>
+          <p:cNvSpPr txBox="1"/>
+          <p:nvPr/>
+        </p:nvSpPr>
+        <p:spPr>
+          <a:xfrm>
+            <a:off x="9240258" y="5072512"/>
+            <a:ext cx="2880147" cy="287130"/>
+          </a:xfrm>
+          <a:prstGeom prst="rect">
+            <a:avLst/>
+          </a:prstGeom>
+          <a:noFill/>
+        </p:spPr>
+        <p:txBody>
+          <a:bodyPr wrap="none" rtlCol="0">
+            <a:spAutoFit/>
+          </a:bodyPr>
+          <a:lstStyle/>
+          <a:p>
+            <a:r>
+              <a:rPr lang="nl-NL" sz="1266" dirty="0"/>
+              <a:t>7. </a:t>
+            </a:r>
+            <a:r>
+              <a:rPr lang="nl-NL" sz="1266" dirty="0" err="1"/>
+              <a:t>curl</a:t>
+            </a:r>
+            <a:r>
+              <a:rPr lang="nl-NL" sz="1266" dirty="0"/>
+              <a:t> /</a:t>
+            </a:r>
+            <a:r>
+              <a:rPr lang="nl-NL" sz="1266" dirty="0" err="1"/>
+              <a:t>reload</a:t>
+            </a:r>
+            <a:r>
+              <a:rPr lang="nl-NL" sz="1266" dirty="0"/>
+              <a:t> //</a:t>
+            </a:r>
+            <a:r>
+              <a:rPr lang="nl-NL" sz="1266" dirty="0" err="1"/>
+              <a:t>refresh</a:t>
+            </a:r>
+            <a:r>
+              <a:rPr lang="nl-NL" sz="1266" dirty="0"/>
+              <a:t> app </a:t>
+            </a:r>
+            <a:r>
+              <a:rPr lang="nl-NL" sz="1266" dirty="0" err="1"/>
+              <a:t>from</a:t>
+            </a:r>
+            <a:r>
+              <a:rPr lang="nl-NL" sz="1266" dirty="0"/>
+              <a:t> GitHub</a:t>
+            </a:r>
+            <a:endParaRPr lang="en-US" sz="1266" dirty="0" err="1"/>
+          </a:p>
+        </p:txBody>
+      </p:sp>
+      <p:cxnSp>
+        <p:nvCxnSpPr>
+          <p:cNvPr id="47" name="Straight Arrow Connector 46">
+            <a:extLst>
+              <a:ext uri="{FF2B5EF4-FFF2-40B4-BE49-F238E27FC236}">
+                <a16:creationId xmlns:a16="http://schemas.microsoft.com/office/drawing/2014/main" id="{188D3921-C601-4A10-93B4-D8C7F401A3AE}"/>
+              </a:ext>
+            </a:extLst>
+          </p:cNvPr>
+          <p:cNvCxnSpPr>
+            <a:cxnSpLocks/>
+          </p:cNvCxnSpPr>
+          <p:nvPr/>
+        </p:nvCxnSpPr>
+        <p:spPr>
+          <a:xfrm flipH="1" flipV="1">
+            <a:off x="8474256" y="4703505"/>
+            <a:ext cx="989871" cy="719350"/>
+          </a:xfrm>
+          <a:prstGeom prst="straightConnector1">
+            <a:avLst/>
+          </a:prstGeom>
+          <a:ln w="28575">
+            <a:tailEnd type="arrow"/>
+          </a:ln>
+        </p:spPr>
+        <p:style>
+          <a:lnRef idx="1">
+            <a:schemeClr val="accent1"/>
+          </a:lnRef>
+          <a:fillRef idx="0">
+            <a:schemeClr val="accent1"/>
+          </a:fillRef>
+          <a:effectRef idx="0">
+            <a:schemeClr val="accent1"/>
+          </a:effectRef>
+          <a:fontRef idx="minor">
+            <a:schemeClr val="tx1"/>
+          </a:fontRef>
+        </p:style>
+      </p:cxnSp>
+      <p:sp>
+        <p:nvSpPr>
+          <p:cNvPr id="50" name="TextBox 49">
+            <a:extLst>
+              <a:ext uri="{FF2B5EF4-FFF2-40B4-BE49-F238E27FC236}">
+                <a16:creationId xmlns:a16="http://schemas.microsoft.com/office/drawing/2014/main" id="{519559A7-E013-4A22-9873-D76CFBE0E071}"/>
+              </a:ext>
+            </a:extLst>
+          </p:cNvPr>
+          <p:cNvSpPr txBox="1"/>
+          <p:nvPr/>
+        </p:nvSpPr>
+        <p:spPr>
+          <a:xfrm>
+            <a:off x="8313610" y="2955698"/>
+            <a:ext cx="1730538" cy="287130"/>
+          </a:xfrm>
+          <a:prstGeom prst="rect">
+            <a:avLst/>
+          </a:prstGeom>
+          <a:noFill/>
+        </p:spPr>
+        <p:txBody>
+          <a:bodyPr wrap="none" rtlCol="0">
+            <a:spAutoFit/>
+          </a:bodyPr>
+          <a:lstStyle/>
+          <a:p>
+            <a:r>
+              <a:rPr lang="nl-NL" sz="1266" dirty="0"/>
+              <a:t>8. pull app </a:t>
+            </a:r>
+            <a:r>
+              <a:rPr lang="nl-NL" sz="1266" dirty="0" err="1"/>
+              <a:t>from</a:t>
+            </a:r>
+            <a:r>
+              <a:rPr lang="nl-NL" sz="1266" dirty="0"/>
+              <a:t> GitHub</a:t>
+            </a:r>
+            <a:endParaRPr lang="en-US" sz="1266" dirty="0" err="1"/>
+          </a:p>
+        </p:txBody>
+      </p:sp>
+      <p:cxnSp>
+        <p:nvCxnSpPr>
+          <p:cNvPr id="51" name="Straight Arrow Connector 50">
+            <a:extLst>
+              <a:ext uri="{FF2B5EF4-FFF2-40B4-BE49-F238E27FC236}">
+                <a16:creationId xmlns:a16="http://schemas.microsoft.com/office/drawing/2014/main" id="{C3E20C9A-E620-4499-A197-F7421E6E6ABF}"/>
+              </a:ext>
+            </a:extLst>
+          </p:cNvPr>
+          <p:cNvCxnSpPr>
+            <a:cxnSpLocks/>
+          </p:cNvCxnSpPr>
+          <p:nvPr/>
+        </p:nvCxnSpPr>
+        <p:spPr>
+          <a:xfrm flipH="1">
+            <a:off x="8017722" y="2898779"/>
+            <a:ext cx="378835" cy="961574"/>
+          </a:xfrm>
+          <a:prstGeom prst="straightConnector1">
+            <a:avLst/>
+          </a:prstGeom>
+          <a:ln w="28575">
+            <a:tailEnd type="arrow"/>
+          </a:ln>
+        </p:spPr>
+        <p:style>
+          <a:lnRef idx="1">
+            <a:schemeClr val="accent1"/>
+          </a:lnRef>
+          <a:fillRef idx="0">
+            <a:schemeClr val="accent1"/>
+          </a:fillRef>
+          <a:effectRef idx="0">
+            <a:schemeClr val="accent1"/>
+          </a:effectRef>
+          <a:fontRef idx="minor">
+            <a:schemeClr val="tx1"/>
+          </a:fontRef>
+        </p:style>
+      </p:cxnSp>
+      <p:sp>
+        <p:nvSpPr>
+          <p:cNvPr id="52" name="TextBox 51">
+            <a:extLst>
+              <a:ext uri="{FF2B5EF4-FFF2-40B4-BE49-F238E27FC236}">
+                <a16:creationId xmlns:a16="http://schemas.microsoft.com/office/drawing/2014/main" id="{F962D0D5-E124-47C6-9F21-9AF9A9E65D70}"/>
+              </a:ext>
+            </a:extLst>
+          </p:cNvPr>
+          <p:cNvSpPr txBox="1"/>
+          <p:nvPr/>
+        </p:nvSpPr>
+        <p:spPr>
+          <a:xfrm>
+            <a:off x="9049948" y="4776050"/>
+            <a:ext cx="1939249" cy="287130"/>
+          </a:xfrm>
+          <a:prstGeom prst="rect">
+            <a:avLst/>
+          </a:prstGeom>
+          <a:noFill/>
+        </p:spPr>
+        <p:txBody>
+          <a:bodyPr wrap="none" rtlCol="0">
+            <a:spAutoFit/>
+          </a:bodyPr>
+          <a:lstStyle/>
+          <a:p>
+            <a:r>
+              <a:rPr lang="nl-NL" sz="1266" dirty="0"/>
+              <a:t>9. </a:t>
+            </a:r>
+            <a:r>
+              <a:rPr lang="nl-NL" sz="1266" dirty="0" err="1"/>
+              <a:t>restart</a:t>
+            </a:r>
+            <a:r>
+              <a:rPr lang="nl-NL" sz="1266" dirty="0"/>
+              <a:t> Node </a:t>
+            </a:r>
+            <a:r>
+              <a:rPr lang="nl-NL" sz="1266" dirty="0" err="1"/>
+              <a:t>application</a:t>
+            </a:r>
+            <a:endParaRPr lang="en-US" sz="1266" dirty="0" err="1"/>
+          </a:p>
+        </p:txBody>
+      </p:sp>
+      <p:pic>
+        <p:nvPicPr>
+          <p:cNvPr id="53" name="Picture 5">
+            <a:extLst>
+              <a:ext uri="{FF2B5EF4-FFF2-40B4-BE49-F238E27FC236}">
+                <a16:creationId xmlns:a16="http://schemas.microsoft.com/office/drawing/2014/main" id="{A441904C-80B9-4829-A1A4-F101826DF205}"/>
+              </a:ext>
+            </a:extLst>
+          </p:cNvPr>
+          <p:cNvPicPr>
+            <a:picLocks noChangeAspect="1" noChangeArrowheads="1"/>
+          </p:cNvPicPr>
+          <p:nvPr/>
+        </p:nvPicPr>
+        <p:blipFill>
+          <a:blip r:embed="rId2">
+            <a:extLst>
+              <a:ext uri="{28A0092B-C50C-407E-A947-70E740481C1C}">
+                <a14:useLocalDpi xmlns:a14="http://schemas.microsoft.com/office/drawing/2010/main" val="0"/>
+              </a:ext>
+            </a:extLst>
+          </a:blip>
+          <a:srcRect/>
+          <a:stretch>
+            <a:fillRect/>
+          </a:stretch>
+        </p:blipFill>
+        <p:spPr bwMode="auto">
+          <a:xfrm>
+            <a:off x="8499792" y="5901680"/>
+            <a:ext cx="1853969" cy="717702"/>
+          </a:xfrm>
+          <a:prstGeom prst="rect">
+            <a:avLst/>
+          </a:prstGeom>
+          <a:noFill/>
+          <a:ln>
+            <a:noFill/>
+          </a:ln>
+          <a:extLst>
+            <a:ext uri="{909E8E84-426E-40DD-AFC4-6F175D3DCCD1}">
+              <a14:hiddenFill xmlns:a14="http://schemas.microsoft.com/office/drawing/2010/main">
+                <a:solidFill>
+                  <a:schemeClr val="accent1"/>
+                </a:solidFill>
+              </a14:hiddenFill>
+            </a:ext>
+            <a:ext uri="{91240B29-F687-4F45-9708-019B960494DF}">
+              <a14:hiddenLine xmlns:a14="http://schemas.microsoft.com/office/drawing/2010/main" w="9525">
+                <a:solidFill>
+                  <a:schemeClr val="tx1"/>
+                </a:solidFill>
+                <a:miter lim="800000"/>
+                <a:headEnd/>
+                <a:tailEnd/>
+              </a14:hiddenLine>
+            </a:ext>
+          </a:extLst>
+        </p:spPr>
+      </p:pic>
+      <p:pic>
+        <p:nvPicPr>
+          <p:cNvPr id="55" name="Picture 4" descr="Image result for logo chrome png">
+            <a:extLst>
+              <a:ext uri="{FF2B5EF4-FFF2-40B4-BE49-F238E27FC236}">
+                <a16:creationId xmlns:a16="http://schemas.microsoft.com/office/drawing/2014/main" id="{F2A0CDAB-2418-4216-BC3B-CA8A5ECCFBCD}"/>
+              </a:ext>
+            </a:extLst>
+          </p:cNvPr>
+          <p:cNvPicPr>
+            <a:picLocks noChangeAspect="1" noChangeArrowheads="1"/>
+          </p:cNvPicPr>
+          <p:nvPr/>
+        </p:nvPicPr>
+        <p:blipFill>
+          <a:blip r:embed="rId10" cstate="print">
+            <a:extLst>
+              <a:ext uri="{28A0092B-C50C-407E-A947-70E740481C1C}">
+                <a14:useLocalDpi xmlns:a14="http://schemas.microsoft.com/office/drawing/2010/main" val="0"/>
+              </a:ext>
+            </a:extLst>
+          </a:blip>
+          <a:srcRect/>
+          <a:stretch>
+            <a:fillRect/>
+          </a:stretch>
+        </p:blipFill>
+        <p:spPr bwMode="auto">
+          <a:xfrm>
+            <a:off x="8376192" y="5471322"/>
+            <a:ext cx="629027" cy="629027"/>
+          </a:xfrm>
+          <a:prstGeom prst="rect">
+            <a:avLst/>
+          </a:prstGeom>
+          <a:noFill/>
+          <a:extLst>
+            <a:ext uri="{909E8E84-426E-40DD-AFC4-6F175D3DCCD1}">
+              <a14:hiddenFill xmlns:a14="http://schemas.microsoft.com/office/drawing/2010/main">
+                <a:solidFill>
+                  <a:srgbClr val="FFFFFF"/>
+                </a:solidFill>
+              </a14:hiddenFill>
+            </a:ext>
+          </a:extLst>
+        </p:spPr>
+      </p:pic>
+      <p:cxnSp>
+        <p:nvCxnSpPr>
+          <p:cNvPr id="56" name="Straight Arrow Connector 55">
+            <a:extLst>
+              <a:ext uri="{FF2B5EF4-FFF2-40B4-BE49-F238E27FC236}">
+                <a16:creationId xmlns:a16="http://schemas.microsoft.com/office/drawing/2014/main" id="{9CF79724-532E-404F-AF7A-A2FE2D447A17}"/>
+              </a:ext>
+            </a:extLst>
+          </p:cNvPr>
+          <p:cNvCxnSpPr>
+            <a:cxnSpLocks/>
+          </p:cNvCxnSpPr>
+          <p:nvPr/>
+        </p:nvCxnSpPr>
+        <p:spPr>
+          <a:xfrm flipH="1" flipV="1">
+            <a:off x="8467388" y="4798086"/>
+            <a:ext cx="1082188" cy="1386795"/>
+          </a:xfrm>
+          <a:prstGeom prst="straightConnector1">
+            <a:avLst/>
+          </a:prstGeom>
+          <a:ln w="28575">
+            <a:tailEnd type="arrow"/>
+          </a:ln>
+        </p:spPr>
+        <p:style>
+          <a:lnRef idx="1">
+            <a:schemeClr val="accent1"/>
+          </a:lnRef>
+          <a:fillRef idx="0">
+            <a:schemeClr val="accent1"/>
+          </a:fillRef>
+          <a:effectRef idx="0">
+            <a:schemeClr val="accent1"/>
+          </a:effectRef>
+          <a:fontRef idx="minor">
+            <a:schemeClr val="tx1"/>
+          </a:fontRef>
+        </p:style>
+      </p:cxnSp>
+      <p:sp>
+        <p:nvSpPr>
+          <p:cNvPr id="58" name="TextBox 57">
+            <a:extLst>
+              <a:ext uri="{FF2B5EF4-FFF2-40B4-BE49-F238E27FC236}">
+                <a16:creationId xmlns:a16="http://schemas.microsoft.com/office/drawing/2014/main" id="{FA07B3AA-6503-4C53-B14D-E645CA7A6BD2}"/>
+              </a:ext>
+            </a:extLst>
+          </p:cNvPr>
+          <p:cNvSpPr txBox="1"/>
+          <p:nvPr/>
+        </p:nvSpPr>
+        <p:spPr>
+          <a:xfrm>
+            <a:off x="9237395" y="5648750"/>
+            <a:ext cx="2281650" cy="287130"/>
+          </a:xfrm>
+          <a:prstGeom prst="rect">
+            <a:avLst/>
+          </a:prstGeom>
+          <a:noFill/>
+        </p:spPr>
+        <p:txBody>
+          <a:bodyPr wrap="none" rtlCol="0">
+            <a:spAutoFit/>
+          </a:bodyPr>
+          <a:lstStyle/>
+          <a:p>
+            <a:r>
+              <a:rPr lang="nl-NL" sz="1266" dirty="0"/>
+              <a:t>10. access </a:t>
+            </a:r>
+            <a:r>
+              <a:rPr lang="nl-NL" sz="1266" dirty="0" err="1"/>
+              <a:t>upgraded</a:t>
+            </a:r>
+            <a:r>
+              <a:rPr lang="nl-NL" sz="1266" dirty="0"/>
+              <a:t> </a:t>
+            </a:r>
+            <a:r>
+              <a:rPr lang="nl-NL" sz="1266" dirty="0" err="1"/>
+              <a:t>application</a:t>
+            </a:r>
+            <a:endParaRPr lang="en-US" sz="1266" dirty="0" err="1"/>
+          </a:p>
+        </p:txBody>
+      </p:sp>
     </p:spTree>
     <p:extLst>
       <p:ext uri="{BB962C8B-B14F-4D97-AF65-F5344CB8AC3E}">
         <p14:creationId xmlns:p14="http://schemas.microsoft.com/office/powerpoint/2010/main" val="1572704244"/>
+      </p:ext>
+    </p:extLst>
+  </p:cSld>
+  <p:clrMapOvr>
+    <a:masterClrMapping/>
+  </p:clrMapOvr>
+</p:sld>
+</file>
+
+<file path=ppt/slides/slide2.xml><?xml version="1.0" encoding="utf-8"?>
+<p:sld xmlns:a="http://schemas.openxmlformats.org/drawingml/2006/main" xmlns:r="http://schemas.openxmlformats.org/officeDocument/2006/relationships" xmlns:p="http://schemas.openxmlformats.org/presentationml/2006/main">
+  <p:cSld>
+    <p:spTree>
+      <p:nvGrpSpPr>
+        <p:cNvPr id="1" name=""/>
+        <p:cNvGrpSpPr/>
+        <p:nvPr/>
+      </p:nvGrpSpPr>
+      <p:grpSpPr>
+        <a:xfrm>
+          <a:off x="0" y="0"/>
+          <a:ext cx="0" cy="0"/>
+          <a:chOff x="0" y="0"/>
+          <a:chExt cx="0" cy="0"/>
+        </a:xfrm>
+      </p:grpSpPr>
+      <p:pic>
+        <p:nvPicPr>
+          <p:cNvPr id="40" name="Picture 25" descr="Image result for docker container icon"/>
+          <p:cNvPicPr>
+            <a:picLocks noChangeAspect="1" noChangeArrowheads="1"/>
+          </p:cNvPicPr>
+          <p:nvPr/>
+        </p:nvPicPr>
+        <p:blipFill>
+          <a:blip r:embed="rId2">
+            <a:extLst>
+              <a:ext uri="{28A0092B-C50C-407E-A947-70E740481C1C}">
+                <a14:useLocalDpi xmlns:a14="http://schemas.microsoft.com/office/drawing/2010/main" val="0"/>
+              </a:ext>
+            </a:extLst>
+          </a:blip>
+          <a:srcRect/>
+          <a:stretch>
+            <a:fillRect/>
+          </a:stretch>
+        </p:blipFill>
+        <p:spPr bwMode="auto">
+          <a:xfrm>
+            <a:off x="4679982" y="2400300"/>
+            <a:ext cx="7365479" cy="4681229"/>
+          </a:xfrm>
+          <a:prstGeom prst="rect">
+            <a:avLst/>
+          </a:prstGeom>
+          <a:ln w="28575">
+            <a:tailEnd type="arrow"/>
+          </a:ln>
+          <a:extLst>
+            <a:ext uri="{909E8E84-426E-40DD-AFC4-6F175D3DCCD1}">
+              <a14:hiddenFill xmlns:a14="http://schemas.microsoft.com/office/drawing/2010/main">
+                <a:solidFill>
+                  <a:srgbClr val="FFFFFF"/>
+                </a:solidFill>
+              </a14:hiddenFill>
+            </a:ext>
+          </a:extLst>
+        </p:spPr>
+      </p:pic>
+      <p:pic>
+        <p:nvPicPr>
+          <p:cNvPr id="41" name="Picture 33" descr="Related image"/>
+          <p:cNvPicPr>
+            <a:picLocks noChangeAspect="1" noChangeArrowheads="1"/>
+          </p:cNvPicPr>
+          <p:nvPr/>
+        </p:nvPicPr>
+        <p:blipFill>
+          <a:blip r:embed="rId3">
+            <a:extLst>
+              <a:ext uri="{28A0092B-C50C-407E-A947-70E740481C1C}">
+                <a14:useLocalDpi xmlns:a14="http://schemas.microsoft.com/office/drawing/2010/main" val="0"/>
+              </a:ext>
+            </a:extLst>
+          </a:blip>
+          <a:srcRect/>
+          <a:stretch>
+            <a:fillRect/>
+          </a:stretch>
+        </p:blipFill>
+        <p:spPr bwMode="auto">
+          <a:xfrm rot="654895">
+            <a:off x="5932614" y="5095276"/>
+            <a:ext cx="1133952" cy="566976"/>
+          </a:xfrm>
+          <a:prstGeom prst="rect">
+            <a:avLst/>
+          </a:prstGeom>
+          <a:noFill/>
+          <a:extLst>
+            <a:ext uri="{909E8E84-426E-40DD-AFC4-6F175D3DCCD1}">
+              <a14:hiddenFill xmlns:a14="http://schemas.microsoft.com/office/drawing/2010/main">
+                <a:solidFill>
+                  <a:srgbClr val="FFFFFF"/>
+                </a:solidFill>
+              </a14:hiddenFill>
+            </a:ext>
+          </a:extLst>
+        </p:spPr>
+      </p:pic>
+      <p:sp>
+        <p:nvSpPr>
+          <p:cNvPr id="2" name="Title 1"/>
+          <p:cNvSpPr>
+            <a:spLocks noGrp="1"/>
+          </p:cNvSpPr>
+          <p:nvPr>
+            <p:ph type="title"/>
+          </p:nvPr>
+        </p:nvSpPr>
+        <p:spPr>
+          <a:xfrm>
+            <a:off x="0" y="12383"/>
+            <a:ext cx="10137210" cy="946580"/>
+          </a:xfrm>
+        </p:spPr>
+        <p:txBody>
+          <a:bodyPr/>
+          <a:lstStyle/>
+          <a:p>
+            <a:r>
+              <a:rPr lang="nl-NL" dirty="0"/>
+              <a:t>Run a Node.JS </a:t>
+            </a:r>
+            <a:r>
+              <a:rPr lang="nl-NL" dirty="0" err="1"/>
+              <a:t>application</a:t>
+            </a:r>
+            <a:r>
+              <a:rPr lang="nl-NL" dirty="0"/>
+              <a:t> </a:t>
+            </a:r>
+            <a:r>
+              <a:rPr lang="nl-NL" dirty="0" err="1"/>
+              <a:t>from</a:t>
+            </a:r>
+            <a:r>
+              <a:rPr lang="nl-NL" dirty="0"/>
+              <a:t> </a:t>
+            </a:r>
+            <a:r>
+              <a:rPr lang="nl-NL" dirty="0" err="1"/>
+              <a:t>Github</a:t>
+            </a:r>
+            <a:br>
+              <a:rPr lang="nl-NL" dirty="0"/>
+            </a:br>
+            <a:r>
+              <a:rPr lang="nl-NL" dirty="0" err="1"/>
+              <a:t>using</a:t>
+            </a:r>
+            <a:r>
+              <a:rPr lang="nl-NL" dirty="0"/>
+              <a:t> </a:t>
+            </a:r>
+            <a:r>
+              <a:rPr lang="nl-NL" dirty="0" err="1"/>
+              <a:t>generic</a:t>
+            </a:r>
+            <a:r>
+              <a:rPr lang="nl-NL" dirty="0"/>
+              <a:t> container image</a:t>
+            </a:r>
+            <a:endParaRPr lang="en-US" dirty="0"/>
+          </a:p>
+        </p:txBody>
+      </p:sp>
+      <p:sp>
+        <p:nvSpPr>
+          <p:cNvPr id="4" name="AutoShape 2" descr="Image result for kubernetes logo"/>
+          <p:cNvSpPr>
+            <a:spLocks noChangeAspect="1" noChangeArrowheads="1"/>
+          </p:cNvSpPr>
+          <p:nvPr/>
+        </p:nvSpPr>
+        <p:spPr bwMode="auto">
+          <a:xfrm>
+            <a:off x="109385" y="-1800289"/>
+            <a:ext cx="4326302" cy="3750355"/>
+          </a:xfrm>
+          <a:prstGeom prst="rect">
+            <a:avLst/>
+          </a:prstGeom>
+          <a:noFill/>
+          <a:extLst>
+            <a:ext uri="{909E8E84-426E-40DD-AFC4-6F175D3DCCD1}">
+              <a14:hiddenFill xmlns:a14="http://schemas.microsoft.com/office/drawing/2010/main">
+                <a:solidFill>
+                  <a:srgbClr val="FFFFFF"/>
+                </a:solidFill>
+              </a14:hiddenFill>
+            </a:ext>
+          </a:extLst>
+        </p:spPr>
+        <p:txBody>
+          <a:bodyPr vert="horz" wrap="square" lIns="64292" tIns="32146" rIns="64292" bIns="32146" numCol="1" anchor="t" anchorCtr="0" compatLnSpc="1">
+            <a:prstTxWarp prst="textNoShape">
+              <a:avLst/>
+            </a:prstTxWarp>
+          </a:bodyPr>
+          <a:lstStyle/>
+          <a:p>
+            <a:endParaRPr lang="en-US" sz="1266"/>
+          </a:p>
+        </p:txBody>
+      </p:sp>
+      <p:sp>
+        <p:nvSpPr>
+          <p:cNvPr id="5" name="AutoShape 4" descr="Image result for kubernetes logo"/>
+          <p:cNvSpPr>
+            <a:spLocks noChangeAspect="1" noChangeArrowheads="1"/>
+          </p:cNvSpPr>
+          <p:nvPr/>
+        </p:nvSpPr>
+        <p:spPr bwMode="auto">
+          <a:xfrm>
+            <a:off x="216538" y="-1693136"/>
+            <a:ext cx="4326302" cy="3750355"/>
+          </a:xfrm>
+          <a:prstGeom prst="rect">
+            <a:avLst/>
+          </a:prstGeom>
+          <a:noFill/>
+          <a:extLst>
+            <a:ext uri="{909E8E84-426E-40DD-AFC4-6F175D3DCCD1}">
+              <a14:hiddenFill xmlns:a14="http://schemas.microsoft.com/office/drawing/2010/main">
+                <a:solidFill>
+                  <a:srgbClr val="FFFFFF"/>
+                </a:solidFill>
+              </a14:hiddenFill>
+            </a:ext>
+          </a:extLst>
+        </p:spPr>
+        <p:txBody>
+          <a:bodyPr vert="horz" wrap="square" lIns="64292" tIns="32146" rIns="64292" bIns="32146" numCol="1" anchor="t" anchorCtr="0" compatLnSpc="1">
+            <a:prstTxWarp prst="textNoShape">
+              <a:avLst/>
+            </a:prstTxWarp>
+          </a:bodyPr>
+          <a:lstStyle/>
+          <a:p>
+            <a:endParaRPr lang="en-US" sz="1266"/>
+          </a:p>
+        </p:txBody>
+      </p:sp>
+      <p:sp>
+        <p:nvSpPr>
+          <p:cNvPr id="6" name="AutoShape 6" descr="Image result for kubernetes logo"/>
+          <p:cNvSpPr>
+            <a:spLocks noChangeAspect="1" noChangeArrowheads="1"/>
+          </p:cNvSpPr>
+          <p:nvPr/>
+        </p:nvSpPr>
+        <p:spPr bwMode="auto">
+          <a:xfrm>
+            <a:off x="323691" y="-1585983"/>
+            <a:ext cx="4326302" cy="3750355"/>
+          </a:xfrm>
+          <a:prstGeom prst="rect">
+            <a:avLst/>
+          </a:prstGeom>
+          <a:noFill/>
+          <a:extLst>
+            <a:ext uri="{909E8E84-426E-40DD-AFC4-6F175D3DCCD1}">
+              <a14:hiddenFill xmlns:a14="http://schemas.microsoft.com/office/drawing/2010/main">
+                <a:solidFill>
+                  <a:srgbClr val="FFFFFF"/>
+                </a:solidFill>
+              </a14:hiddenFill>
+            </a:ext>
+          </a:extLst>
+        </p:spPr>
+        <p:txBody>
+          <a:bodyPr vert="horz" wrap="square" lIns="64292" tIns="32146" rIns="64292" bIns="32146" numCol="1" anchor="t" anchorCtr="0" compatLnSpc="1">
+            <a:prstTxWarp prst="textNoShape">
+              <a:avLst/>
+            </a:prstTxWarp>
+          </a:bodyPr>
+          <a:lstStyle/>
+          <a:p>
+            <a:endParaRPr lang="en-US" sz="1266"/>
+          </a:p>
+        </p:txBody>
+      </p:sp>
+      <p:sp>
+        <p:nvSpPr>
+          <p:cNvPr id="7" name="AutoShape 8" descr="Kubernetes Logo"/>
+          <p:cNvSpPr>
+            <a:spLocks noChangeAspect="1" noChangeArrowheads="1"/>
+          </p:cNvSpPr>
+          <p:nvPr/>
+        </p:nvSpPr>
+        <p:spPr bwMode="auto">
+          <a:xfrm>
+            <a:off x="109385" y="-288985"/>
+            <a:ext cx="602736" cy="602736"/>
+          </a:xfrm>
+          <a:prstGeom prst="rect">
+            <a:avLst/>
+          </a:prstGeom>
+          <a:noFill/>
+          <a:extLst>
+            <a:ext uri="{909E8E84-426E-40DD-AFC4-6F175D3DCCD1}">
+              <a14:hiddenFill xmlns:a14="http://schemas.microsoft.com/office/drawing/2010/main">
+                <a:solidFill>
+                  <a:srgbClr val="FFFFFF"/>
+                </a:solidFill>
+              </a14:hiddenFill>
+            </a:ext>
+          </a:extLst>
+        </p:spPr>
+        <p:txBody>
+          <a:bodyPr vert="horz" wrap="square" lIns="64292" tIns="32146" rIns="64292" bIns="32146" numCol="1" anchor="t" anchorCtr="0" compatLnSpc="1">
+            <a:prstTxWarp prst="textNoShape">
+              <a:avLst/>
+            </a:prstTxWarp>
+          </a:bodyPr>
+          <a:lstStyle/>
+          <a:p>
+            <a:endParaRPr lang="en-US" sz="1266"/>
+          </a:p>
+        </p:txBody>
+      </p:sp>
+      <p:sp>
+        <p:nvSpPr>
+          <p:cNvPr id="8" name="AutoShape 10" descr="Kubernetes Logo"/>
+          <p:cNvSpPr>
+            <a:spLocks noChangeAspect="1" noChangeArrowheads="1"/>
+          </p:cNvSpPr>
+          <p:nvPr/>
+        </p:nvSpPr>
+        <p:spPr bwMode="auto">
+          <a:xfrm>
+            <a:off x="216538" y="-181832"/>
+            <a:ext cx="602736" cy="602736"/>
+          </a:xfrm>
+          <a:prstGeom prst="rect">
+            <a:avLst/>
+          </a:prstGeom>
+          <a:noFill/>
+          <a:extLst>
+            <a:ext uri="{909E8E84-426E-40DD-AFC4-6F175D3DCCD1}">
+              <a14:hiddenFill xmlns:a14="http://schemas.microsoft.com/office/drawing/2010/main">
+                <a:solidFill>
+                  <a:srgbClr val="FFFFFF"/>
+                </a:solidFill>
+              </a14:hiddenFill>
+            </a:ext>
+          </a:extLst>
+        </p:spPr>
+        <p:txBody>
+          <a:bodyPr vert="horz" wrap="square" lIns="64292" tIns="32146" rIns="64292" bIns="32146" numCol="1" anchor="t" anchorCtr="0" compatLnSpc="1">
+            <a:prstTxWarp prst="textNoShape">
+              <a:avLst/>
+            </a:prstTxWarp>
+          </a:bodyPr>
+          <a:lstStyle/>
+          <a:p>
+            <a:endParaRPr lang="en-US" sz="1266"/>
+          </a:p>
+        </p:txBody>
+      </p:sp>
+      <p:sp>
+        <p:nvSpPr>
+          <p:cNvPr id="11" name="AutoShape 19" descr="Image result for docker logo transparent"/>
+          <p:cNvSpPr>
+            <a:spLocks noChangeAspect="1" noChangeArrowheads="1"/>
+          </p:cNvSpPr>
+          <p:nvPr/>
+        </p:nvSpPr>
+        <p:spPr bwMode="auto">
+          <a:xfrm>
+            <a:off x="323692" y="-444134"/>
+            <a:ext cx="1640780" cy="1379595"/>
+          </a:xfrm>
+          <a:prstGeom prst="rect">
+            <a:avLst/>
+          </a:prstGeom>
+          <a:noFill/>
+          <a:extLst>
+            <a:ext uri="{909E8E84-426E-40DD-AFC4-6F175D3DCCD1}">
+              <a14:hiddenFill xmlns:a14="http://schemas.microsoft.com/office/drawing/2010/main">
+                <a:solidFill>
+                  <a:srgbClr val="FFFFFF"/>
+                </a:solidFill>
+              </a14:hiddenFill>
+            </a:ext>
+          </a:extLst>
+        </p:spPr>
+        <p:txBody>
+          <a:bodyPr vert="horz" wrap="square" lIns="64292" tIns="32146" rIns="64292" bIns="32146" numCol="1" anchor="t" anchorCtr="0" compatLnSpc="1">
+            <a:prstTxWarp prst="textNoShape">
+              <a:avLst/>
+            </a:prstTxWarp>
+          </a:bodyPr>
+          <a:lstStyle/>
+          <a:p>
+            <a:endParaRPr lang="en-US" sz="1266"/>
+          </a:p>
+        </p:txBody>
+      </p:sp>
+      <p:sp>
+        <p:nvSpPr>
+          <p:cNvPr id="12" name="AutoShape 21" descr="Image result for docker logo transparent"/>
+          <p:cNvSpPr>
+            <a:spLocks noChangeAspect="1" noChangeArrowheads="1"/>
+          </p:cNvSpPr>
+          <p:nvPr/>
+        </p:nvSpPr>
+        <p:spPr bwMode="auto">
+          <a:xfrm>
+            <a:off x="430845" y="-336981"/>
+            <a:ext cx="1640780" cy="1379595"/>
+          </a:xfrm>
+          <a:prstGeom prst="rect">
+            <a:avLst/>
+          </a:prstGeom>
+          <a:noFill/>
+          <a:extLst>
+            <a:ext uri="{909E8E84-426E-40DD-AFC4-6F175D3DCCD1}">
+              <a14:hiddenFill xmlns:a14="http://schemas.microsoft.com/office/drawing/2010/main">
+                <a:solidFill>
+                  <a:srgbClr val="FFFFFF"/>
+                </a:solidFill>
+              </a14:hiddenFill>
+            </a:ext>
+          </a:extLst>
+        </p:spPr>
+        <p:txBody>
+          <a:bodyPr vert="horz" wrap="square" lIns="64292" tIns="32146" rIns="64292" bIns="32146" numCol="1" anchor="t" anchorCtr="0" compatLnSpc="1">
+            <a:prstTxWarp prst="textNoShape">
+              <a:avLst/>
+            </a:prstTxWarp>
+          </a:bodyPr>
+          <a:lstStyle/>
+          <a:p>
+            <a:endParaRPr lang="en-US" sz="1266"/>
+          </a:p>
+        </p:txBody>
+      </p:sp>
+      <p:sp>
+        <p:nvSpPr>
+          <p:cNvPr id="13" name="AutoShape 27" descr="Image result for nodejs logo"/>
+          <p:cNvSpPr>
+            <a:spLocks noChangeAspect="1" noChangeArrowheads="1"/>
+          </p:cNvSpPr>
+          <p:nvPr/>
+        </p:nvSpPr>
+        <p:spPr bwMode="auto">
+          <a:xfrm>
+            <a:off x="109386" y="-508872"/>
+            <a:ext cx="3951266" cy="1064833"/>
+          </a:xfrm>
+          <a:prstGeom prst="rect">
+            <a:avLst/>
+          </a:prstGeom>
+          <a:noFill/>
+          <a:extLst>
+            <a:ext uri="{909E8E84-426E-40DD-AFC4-6F175D3DCCD1}">
+              <a14:hiddenFill xmlns:a14="http://schemas.microsoft.com/office/drawing/2010/main">
+                <a:solidFill>
+                  <a:srgbClr val="FFFFFF"/>
+                </a:solidFill>
+              </a14:hiddenFill>
+            </a:ext>
+          </a:extLst>
+        </p:spPr>
+        <p:txBody>
+          <a:bodyPr vert="horz" wrap="square" lIns="64292" tIns="32146" rIns="64292" bIns="32146" numCol="1" anchor="t" anchorCtr="0" compatLnSpc="1">
+            <a:prstTxWarp prst="textNoShape">
+              <a:avLst/>
+            </a:prstTxWarp>
+          </a:bodyPr>
+          <a:lstStyle/>
+          <a:p>
+            <a:endParaRPr lang="en-US" sz="1266"/>
+          </a:p>
+        </p:txBody>
+      </p:sp>
+      <p:sp>
+        <p:nvSpPr>
+          <p:cNvPr id="14" name="AutoShape 29" descr="Image result for nodejs logo"/>
+          <p:cNvSpPr>
+            <a:spLocks noChangeAspect="1" noChangeArrowheads="1"/>
+          </p:cNvSpPr>
+          <p:nvPr/>
+        </p:nvSpPr>
+        <p:spPr bwMode="auto">
+          <a:xfrm>
+            <a:off x="216539" y="-401719"/>
+            <a:ext cx="3951266" cy="1064833"/>
+          </a:xfrm>
+          <a:prstGeom prst="rect">
+            <a:avLst/>
+          </a:prstGeom>
+          <a:noFill/>
+          <a:extLst>
+            <a:ext uri="{909E8E84-426E-40DD-AFC4-6F175D3DCCD1}">
+              <a14:hiddenFill xmlns:a14="http://schemas.microsoft.com/office/drawing/2010/main">
+                <a:solidFill>
+                  <a:srgbClr val="FFFFFF"/>
+                </a:solidFill>
+              </a14:hiddenFill>
+            </a:ext>
+          </a:extLst>
+        </p:spPr>
+        <p:txBody>
+          <a:bodyPr vert="horz" wrap="square" lIns="64292" tIns="32146" rIns="64292" bIns="32146" numCol="1" anchor="t" anchorCtr="0" compatLnSpc="1">
+            <a:prstTxWarp prst="textNoShape">
+              <a:avLst/>
+            </a:prstTxWarp>
+          </a:bodyPr>
+          <a:lstStyle/>
+          <a:p>
+            <a:endParaRPr lang="en-US" sz="1266"/>
+          </a:p>
+        </p:txBody>
+      </p:sp>
+      <p:sp>
+        <p:nvSpPr>
+          <p:cNvPr id="15" name="AutoShape 31" descr="Image result for nodejs logo"/>
+          <p:cNvSpPr>
+            <a:spLocks noChangeAspect="1" noChangeArrowheads="1"/>
+          </p:cNvSpPr>
+          <p:nvPr/>
+        </p:nvSpPr>
+        <p:spPr bwMode="auto">
+          <a:xfrm>
+            <a:off x="109386" y="-508872"/>
+            <a:ext cx="2129665" cy="1064833"/>
+          </a:xfrm>
+          <a:prstGeom prst="rect">
+            <a:avLst/>
+          </a:prstGeom>
+          <a:noFill/>
+          <a:extLst>
+            <a:ext uri="{909E8E84-426E-40DD-AFC4-6F175D3DCCD1}">
+              <a14:hiddenFill xmlns:a14="http://schemas.microsoft.com/office/drawing/2010/main">
+                <a:solidFill>
+                  <a:srgbClr val="FFFFFF"/>
+                </a:solidFill>
+              </a14:hiddenFill>
+            </a:ext>
+          </a:extLst>
+        </p:spPr>
+        <p:txBody>
+          <a:bodyPr vert="horz" wrap="square" lIns="64292" tIns="32146" rIns="64292" bIns="32146" numCol="1" anchor="t" anchorCtr="0" compatLnSpc="1">
+            <a:prstTxWarp prst="textNoShape">
+              <a:avLst/>
+            </a:prstTxWarp>
+          </a:bodyPr>
+          <a:lstStyle/>
+          <a:p>
+            <a:endParaRPr lang="en-US" sz="1266"/>
+          </a:p>
+        </p:txBody>
+      </p:sp>
+      <p:grpSp>
+        <p:nvGrpSpPr>
+          <p:cNvPr id="18" name="Group 17"/>
+          <p:cNvGrpSpPr/>
+          <p:nvPr/>
+        </p:nvGrpSpPr>
+        <p:grpSpPr>
+          <a:xfrm>
+            <a:off x="6032820" y="1606582"/>
+            <a:ext cx="3345555" cy="1392989"/>
+            <a:chOff x="7296572" y="2958085"/>
+            <a:chExt cx="8339668" cy="3595115"/>
+          </a:xfrm>
+        </p:grpSpPr>
+        <p:sp>
+          <p:nvSpPr>
+            <p:cNvPr id="34" name="Cube 33"/>
+            <p:cNvSpPr/>
+            <p:nvPr/>
+          </p:nvSpPr>
+          <p:spPr>
+            <a:xfrm>
+              <a:off x="7296572" y="2958085"/>
+              <a:ext cx="8339668" cy="3595115"/>
+            </a:xfrm>
+            <a:prstGeom prst="cube">
+              <a:avLst/>
+            </a:prstGeom>
+            <a:solidFill>
+              <a:schemeClr val="bg1">
+                <a:lumMod val="75000"/>
+              </a:schemeClr>
+            </a:solidFill>
+          </p:spPr>
+          <p:style>
+            <a:lnRef idx="1">
+              <a:schemeClr val="dk1"/>
+            </a:lnRef>
+            <a:fillRef idx="2">
+              <a:schemeClr val="dk1"/>
+            </a:fillRef>
+            <a:effectRef idx="1">
+              <a:schemeClr val="dk1"/>
+            </a:effectRef>
+            <a:fontRef idx="minor">
+              <a:schemeClr val="dk1"/>
+            </a:fontRef>
+          </p:style>
+          <p:txBody>
+            <a:bodyPr rtlCol="0" anchor="ctr"/>
+            <a:lstStyle/>
+            <a:p>
+              <a:pPr algn="ctr"/>
+              <a:endParaRPr lang="en-US" sz="1266"/>
+            </a:p>
+          </p:txBody>
+        </p:sp>
+        <p:pic>
+          <p:nvPicPr>
+            <p:cNvPr id="35" name="Picture 34" descr="Image result for logo github"/>
+            <p:cNvPicPr>
+              <a:picLocks noChangeAspect="1" noChangeArrowheads="1"/>
+            </p:cNvPicPr>
+            <p:nvPr/>
+          </p:nvPicPr>
+          <p:blipFill rotWithShape="1">
+            <a:blip r:embed="rId4">
+              <a:clrChange>
+                <a:clrFrom>
+                  <a:srgbClr val="FFFFFF"/>
+                </a:clrFrom>
+                <a:clrTo>
+                  <a:srgbClr val="FFFFFF">
+                    <a:alpha val="0"/>
+                  </a:srgbClr>
+                </a:clrTo>
+              </a:clrChange>
+              <a:extLst>
+                <a:ext uri="{28A0092B-C50C-407E-A947-70E740481C1C}">
+                  <a14:useLocalDpi xmlns:a14="http://schemas.microsoft.com/office/drawing/2010/main" val="0"/>
+                </a:ext>
+              </a:extLst>
+            </a:blip>
+            <a:srcRect t="31427" b="34286"/>
+            <a:stretch/>
+          </p:blipFill>
+          <p:spPr bwMode="auto">
+            <a:xfrm>
+              <a:off x="11338559" y="5619458"/>
+              <a:ext cx="3239135" cy="832939"/>
+            </a:xfrm>
+            <a:prstGeom prst="rect">
+              <a:avLst/>
+            </a:prstGeom>
+            <a:noFill/>
+            <a:extLst>
+              <a:ext uri="{909E8E84-426E-40DD-AFC4-6F175D3DCCD1}">
+                <a14:hiddenFill xmlns:a14="http://schemas.microsoft.com/office/drawing/2010/main">
+                  <a:solidFill>
+                    <a:srgbClr val="FFFFFF"/>
+                  </a:solidFill>
+                </a14:hiddenFill>
+              </a:ext>
+            </a:extLst>
+          </p:spPr>
+        </p:pic>
+        <p:pic>
+          <p:nvPicPr>
+            <p:cNvPr id="36" name="Picture 3"/>
+            <p:cNvPicPr>
+              <a:picLocks noChangeAspect="1" noChangeArrowheads="1"/>
+            </p:cNvPicPr>
+            <p:nvPr/>
+          </p:nvPicPr>
+          <p:blipFill>
+            <a:blip r:embed="rId5" cstate="print">
+              <a:duotone>
+                <a:prstClr val="black"/>
+                <a:schemeClr val="accent2">
+                  <a:tint val="45000"/>
+                  <a:satMod val="400000"/>
+                </a:schemeClr>
+              </a:duotone>
+              <a:extLst>
+                <a:ext uri="{28A0092B-C50C-407E-A947-70E740481C1C}">
+                  <a14:useLocalDpi xmlns:a14="http://schemas.microsoft.com/office/drawing/2010/main" val="0"/>
+                </a:ext>
+              </a:extLst>
+            </a:blip>
+            <a:srcRect/>
+            <a:stretch>
+              <a:fillRect/>
+            </a:stretch>
+          </p:blipFill>
+          <p:spPr bwMode="auto">
+            <a:xfrm>
+              <a:off x="7591185" y="4196371"/>
+              <a:ext cx="3116501" cy="1759339"/>
+            </a:xfrm>
+            <a:prstGeom prst="rect">
+              <a:avLst/>
+            </a:prstGeom>
+            <a:noFill/>
+            <a:ln w="9525">
+              <a:solidFill>
+                <a:schemeClr val="tx1"/>
+              </a:solidFill>
+              <a:miter lim="800000"/>
+              <a:headEnd/>
+              <a:tailEnd/>
+            </a:ln>
+            <a:extLst>
+              <a:ext uri="{909E8E84-426E-40DD-AFC4-6F175D3DCCD1}">
+                <a14:hiddenFill xmlns:a14="http://schemas.microsoft.com/office/drawing/2010/main">
+                  <a:solidFill>
+                    <a:schemeClr val="accent1"/>
+                  </a:solidFill>
+                </a14:hiddenFill>
+              </a:ext>
+            </a:extLst>
+          </p:spPr>
+        </p:pic>
+      </p:grpSp>
+      <p:pic>
+        <p:nvPicPr>
+          <p:cNvPr id="3074" name="Picture 2" descr="Image result for logo npm"/>
+          <p:cNvPicPr>
+            <a:picLocks noChangeAspect="1" noChangeArrowheads="1"/>
+          </p:cNvPicPr>
+          <p:nvPr/>
+        </p:nvPicPr>
+        <p:blipFill>
+          <a:blip r:embed="rId6" cstate="print">
+            <a:extLst>
+              <a:ext uri="{28A0092B-C50C-407E-A947-70E740481C1C}">
+                <a14:useLocalDpi xmlns:a14="http://schemas.microsoft.com/office/drawing/2010/main" val="0"/>
+              </a:ext>
+            </a:extLst>
+          </a:blip>
+          <a:srcRect/>
+          <a:stretch>
+            <a:fillRect/>
+          </a:stretch>
+        </p:blipFill>
+        <p:spPr bwMode="auto">
+          <a:xfrm rot="860223">
+            <a:off x="5958957" y="5017090"/>
+            <a:ext cx="577531" cy="224897"/>
+          </a:xfrm>
+          <a:prstGeom prst="rect">
+            <a:avLst/>
+          </a:prstGeom>
+          <a:noFill/>
+          <a:extLst>
+            <a:ext uri="{909E8E84-426E-40DD-AFC4-6F175D3DCCD1}">
+              <a14:hiddenFill xmlns:a14="http://schemas.microsoft.com/office/drawing/2010/main">
+                <a:solidFill>
+                  <a:srgbClr val="FFFFFF"/>
+                </a:solidFill>
+              </a14:hiddenFill>
+            </a:ext>
+          </a:extLst>
+        </p:spPr>
+      </p:pic>
+      <p:pic>
+        <p:nvPicPr>
+          <p:cNvPr id="1026" name="Picture 2" descr="Image result for nodemon">
+            <a:extLst>
+              <a:ext uri="{FF2B5EF4-FFF2-40B4-BE49-F238E27FC236}">
+                <a16:creationId xmlns:a16="http://schemas.microsoft.com/office/drawing/2014/main" id="{02046A2D-1F44-4200-AFBE-0103572EED62}"/>
+              </a:ext>
+            </a:extLst>
+          </p:cNvPr>
+          <p:cNvPicPr>
+            <a:picLocks noChangeAspect="1" noChangeArrowheads="1"/>
+          </p:cNvPicPr>
+          <p:nvPr/>
+        </p:nvPicPr>
+        <p:blipFill>
+          <a:blip r:embed="rId7">
+            <a:extLst>
+              <a:ext uri="{28A0092B-C50C-407E-A947-70E740481C1C}">
+                <a14:useLocalDpi xmlns:a14="http://schemas.microsoft.com/office/drawing/2010/main" val="0"/>
+              </a:ext>
+            </a:extLst>
+          </a:blip>
+          <a:srcRect/>
+          <a:stretch>
+            <a:fillRect/>
+          </a:stretch>
+        </p:blipFill>
+        <p:spPr bwMode="auto">
+          <a:xfrm>
+            <a:off x="8683925" y="4486420"/>
+            <a:ext cx="460075" cy="523593"/>
+          </a:xfrm>
+          <a:prstGeom prst="rect">
+            <a:avLst/>
+          </a:prstGeom>
+          <a:noFill/>
+          <a:extLst>
+            <a:ext uri="{909E8E84-426E-40DD-AFC4-6F175D3DCCD1}">
+              <a14:hiddenFill xmlns:a14="http://schemas.microsoft.com/office/drawing/2010/main">
+                <a:solidFill>
+                  <a:srgbClr val="FFFFFF"/>
+                </a:solidFill>
+              </a14:hiddenFill>
+            </a:ext>
+          </a:extLst>
+        </p:spPr>
+      </p:pic>
+      <p:sp>
+        <p:nvSpPr>
+          <p:cNvPr id="16" name="Rectangle: Rounded Corners 15">
+            <a:extLst>
+              <a:ext uri="{FF2B5EF4-FFF2-40B4-BE49-F238E27FC236}">
+                <a16:creationId xmlns:a16="http://schemas.microsoft.com/office/drawing/2014/main" id="{BAE1A7F2-F33F-422D-83BE-F807B88B692C}"/>
+              </a:ext>
+            </a:extLst>
+          </p:cNvPr>
+          <p:cNvSpPr/>
+          <p:nvPr/>
+        </p:nvSpPr>
+        <p:spPr>
+          <a:xfrm>
+            <a:off x="8065705" y="3919502"/>
+            <a:ext cx="983302" cy="490989"/>
+          </a:xfrm>
+          <a:prstGeom prst="roundRect">
+            <a:avLst/>
+          </a:prstGeom>
+        </p:spPr>
+        <p:style>
+          <a:lnRef idx="0">
+            <a:schemeClr val="accent2"/>
+          </a:lnRef>
+          <a:fillRef idx="3">
+            <a:schemeClr val="accent2"/>
+          </a:fillRef>
+          <a:effectRef idx="3">
+            <a:schemeClr val="accent2"/>
+          </a:effectRef>
+          <a:fontRef idx="minor">
+            <a:schemeClr val="lt1"/>
+          </a:fontRef>
+        </p:style>
+        <p:txBody>
+          <a:bodyPr rtlCol="0" anchor="ctr"/>
+          <a:lstStyle/>
+          <a:p>
+            <a:pPr algn="ctr"/>
+            <a:r>
+              <a:rPr lang="nl-NL" sz="1200" dirty="0"/>
+              <a:t>Node </a:t>
+            </a:r>
+            <a:r>
+              <a:rPr lang="nl-NL" sz="1200" dirty="0" err="1"/>
+              <a:t>application</a:t>
+            </a:r>
+            <a:endParaRPr lang="en-NL" sz="1200" dirty="0"/>
+          </a:p>
+        </p:txBody>
+      </p:sp>
+      <p:sp>
+        <p:nvSpPr>
+          <p:cNvPr id="59" name="Speech Bubble: Rectangle 58">
+            <a:extLst>
+              <a:ext uri="{FF2B5EF4-FFF2-40B4-BE49-F238E27FC236}">
+                <a16:creationId xmlns:a16="http://schemas.microsoft.com/office/drawing/2014/main" id="{291F3D59-FEC6-4D88-9998-35F888E0D7E2}"/>
+              </a:ext>
+            </a:extLst>
+          </p:cNvPr>
+          <p:cNvSpPr/>
+          <p:nvPr/>
+        </p:nvSpPr>
+        <p:spPr>
+          <a:xfrm>
+            <a:off x="10291737" y="1613666"/>
+            <a:ext cx="1580536" cy="1198274"/>
+          </a:xfrm>
+          <a:prstGeom prst="wedgeRectCallout">
+            <a:avLst>
+              <a:gd name="adj1" fmla="val -56019"/>
+              <a:gd name="adj2" fmla="val 132234"/>
+            </a:avLst>
+          </a:prstGeom>
+        </p:spPr>
+        <p:style>
+          <a:lnRef idx="2">
+            <a:schemeClr val="accent1">
+              <a:shade val="50000"/>
+            </a:schemeClr>
+          </a:lnRef>
+          <a:fillRef idx="1">
+            <a:schemeClr val="accent1"/>
+          </a:fillRef>
+          <a:effectRef idx="0">
+            <a:schemeClr val="accent1"/>
+          </a:effectRef>
+          <a:fontRef idx="minor">
+            <a:schemeClr val="lt1"/>
+          </a:fontRef>
+        </p:style>
+        <p:txBody>
+          <a:bodyPr rtlCol="0" anchor="ctr"/>
+          <a:lstStyle/>
+          <a:p>
+            <a:r>
+              <a:rPr lang="nl-NL" sz="1400" dirty="0"/>
+              <a:t>Node 8</a:t>
+            </a:r>
+          </a:p>
+          <a:p>
+            <a:r>
+              <a:rPr lang="nl-NL" sz="1400" dirty="0" err="1"/>
+              <a:t>npm</a:t>
+            </a:r>
+            <a:endParaRPr lang="nl-NL" sz="1400" dirty="0"/>
+          </a:p>
+          <a:p>
+            <a:r>
+              <a:rPr lang="nl-NL" sz="1400" dirty="0"/>
+              <a:t>git </a:t>
+            </a:r>
+            <a:r>
+              <a:rPr lang="nl-NL" sz="1400" dirty="0" err="1"/>
+              <a:t>client</a:t>
+            </a:r>
+            <a:endParaRPr lang="nl-NL" sz="1400" dirty="0"/>
+          </a:p>
+          <a:p>
+            <a:r>
+              <a:rPr lang="nl-NL" sz="1400" dirty="0" err="1"/>
+              <a:t>nodemon</a:t>
+            </a:r>
+            <a:endParaRPr lang="nl-NL" sz="1400" dirty="0"/>
+          </a:p>
+          <a:p>
+            <a:r>
+              <a:rPr lang="nl-NL" sz="1400" dirty="0"/>
+              <a:t>node </a:t>
+            </a:r>
+            <a:r>
+              <a:rPr lang="nl-NL" sz="1400" dirty="0" err="1"/>
+              <a:t>reload</a:t>
+            </a:r>
+            <a:r>
+              <a:rPr lang="nl-NL" sz="1400" dirty="0"/>
+              <a:t> app</a:t>
+            </a:r>
+            <a:endParaRPr lang="en-NL" sz="1400" dirty="0"/>
+          </a:p>
+        </p:txBody>
+      </p:sp>
+      <p:sp>
+        <p:nvSpPr>
+          <p:cNvPr id="60" name="Rectangle: Rounded Corners 59">
+            <a:extLst>
+              <a:ext uri="{FF2B5EF4-FFF2-40B4-BE49-F238E27FC236}">
+                <a16:creationId xmlns:a16="http://schemas.microsoft.com/office/drawing/2014/main" id="{61EC0AE8-34BB-483B-8E5B-AE376902DF61}"/>
+              </a:ext>
+            </a:extLst>
+          </p:cNvPr>
+          <p:cNvSpPr/>
+          <p:nvPr/>
+        </p:nvSpPr>
+        <p:spPr>
+          <a:xfrm>
+            <a:off x="5867709" y="3759172"/>
+            <a:ext cx="1143861" cy="643174"/>
+          </a:xfrm>
+          <a:prstGeom prst="roundRect">
+            <a:avLst/>
+          </a:prstGeom>
+        </p:spPr>
+        <p:style>
+          <a:lnRef idx="2">
+            <a:schemeClr val="accent1">
+              <a:shade val="50000"/>
+            </a:schemeClr>
+          </a:lnRef>
+          <a:fillRef idx="1">
+            <a:schemeClr val="accent1"/>
+          </a:fillRef>
+          <a:effectRef idx="0">
+            <a:schemeClr val="accent1"/>
+          </a:effectRef>
+          <a:fontRef idx="minor">
+            <a:schemeClr val="lt1"/>
+          </a:fontRef>
+        </p:style>
+        <p:txBody>
+          <a:bodyPr rtlCol="0" anchor="ctr"/>
+          <a:lstStyle/>
+          <a:p>
+            <a:pPr algn="ctr"/>
+            <a:r>
+              <a:rPr lang="nl-NL" sz="1200" dirty="0" err="1"/>
+              <a:t>GitHubReload</a:t>
+            </a:r>
+            <a:r>
+              <a:rPr lang="nl-NL" sz="1200" dirty="0"/>
+              <a:t> Node </a:t>
+            </a:r>
+            <a:r>
+              <a:rPr lang="nl-NL" sz="1200" dirty="0" err="1"/>
+              <a:t>application</a:t>
+            </a:r>
+            <a:endParaRPr lang="en-NL" sz="1200" dirty="0"/>
+          </a:p>
+        </p:txBody>
+      </p:sp>
+      <p:pic>
+        <p:nvPicPr>
+          <p:cNvPr id="1028" name="Picture 4" descr="Image result for git logo">
+            <a:extLst>
+              <a:ext uri="{FF2B5EF4-FFF2-40B4-BE49-F238E27FC236}">
+                <a16:creationId xmlns:a16="http://schemas.microsoft.com/office/drawing/2014/main" id="{9E7AEC14-CE13-44E1-A2D7-ECB4CCFCFBE1}"/>
+              </a:ext>
+            </a:extLst>
+          </p:cNvPr>
+          <p:cNvPicPr>
+            <a:picLocks noChangeAspect="1" noChangeArrowheads="1"/>
+          </p:cNvPicPr>
+          <p:nvPr/>
+        </p:nvPicPr>
+        <p:blipFill>
+          <a:blip r:embed="rId8">
+            <a:extLst>
+              <a:ext uri="{28A0092B-C50C-407E-A947-70E740481C1C}">
+                <a14:useLocalDpi xmlns:a14="http://schemas.microsoft.com/office/drawing/2010/main" val="0"/>
+              </a:ext>
+            </a:extLst>
+          </a:blip>
+          <a:srcRect/>
+          <a:stretch>
+            <a:fillRect/>
+          </a:stretch>
+        </p:blipFill>
+        <p:spPr bwMode="auto">
+          <a:xfrm>
+            <a:off x="8480437" y="5687932"/>
+            <a:ext cx="550985" cy="217430"/>
+          </a:xfrm>
+          <a:prstGeom prst="rect">
+            <a:avLst/>
+          </a:prstGeom>
+          <a:noFill/>
+          <a:extLst>
+            <a:ext uri="{909E8E84-426E-40DD-AFC4-6F175D3DCCD1}">
+              <a14:hiddenFill xmlns:a14="http://schemas.microsoft.com/office/drawing/2010/main">
+                <a:solidFill>
+                  <a:srgbClr val="FFFFFF"/>
+                </a:solidFill>
+              </a14:hiddenFill>
+            </a:ext>
+          </a:extLst>
+        </p:spPr>
+      </p:pic>
+      <p:sp>
+        <p:nvSpPr>
+          <p:cNvPr id="20" name="Freeform: Shape 19">
+            <a:extLst>
+              <a:ext uri="{FF2B5EF4-FFF2-40B4-BE49-F238E27FC236}">
+                <a16:creationId xmlns:a16="http://schemas.microsoft.com/office/drawing/2014/main" id="{68EF2134-496B-4E35-9362-D522F4564A97}"/>
+              </a:ext>
+            </a:extLst>
+          </p:cNvPr>
+          <p:cNvSpPr/>
+          <p:nvPr/>
+        </p:nvSpPr>
+        <p:spPr>
+          <a:xfrm>
+            <a:off x="6400185" y="2721884"/>
+            <a:ext cx="1618400" cy="1366539"/>
+          </a:xfrm>
+          <a:custGeom>
+            <a:avLst/>
+            <a:gdLst>
+              <a:gd name="connsiteX0" fmla="*/ 62161 w 1618400"/>
+              <a:gd name="connsiteY0" fmla="*/ 1041224 h 1366539"/>
+              <a:gd name="connsiteX1" fmla="*/ 185253 w 1618400"/>
+              <a:gd name="connsiteY1" fmla="*/ 3731 h 1366539"/>
+              <a:gd name="connsiteX2" fmla="*/ 1618400 w 1618400"/>
+              <a:gd name="connsiteY2" fmla="*/ 1366539 h 1366539"/>
+            </a:gdLst>
+            <a:ahLst/>
+            <a:cxnLst>
+              <a:cxn ang="0">
+                <a:pos x="connsiteX0" y="connsiteY0"/>
+              </a:cxn>
+              <a:cxn ang="0">
+                <a:pos x="connsiteX1" y="connsiteY1"/>
+              </a:cxn>
+              <a:cxn ang="0">
+                <a:pos x="connsiteX2" y="connsiteY2"/>
+              </a:cxn>
+            </a:cxnLst>
+            <a:rect l="l" t="t" r="r" b="b"/>
+            <a:pathLst>
+              <a:path w="1618400" h="1366539">
+                <a:moveTo>
+                  <a:pt x="62161" y="1041224"/>
+                </a:moveTo>
+                <a:cubicBezTo>
+                  <a:pt x="-5980" y="495368"/>
+                  <a:pt x="-74120" y="-50488"/>
+                  <a:pt x="185253" y="3731"/>
+                </a:cubicBezTo>
+                <a:cubicBezTo>
+                  <a:pt x="444626" y="57950"/>
+                  <a:pt x="1031513" y="712244"/>
+                  <a:pt x="1618400" y="1366539"/>
+                </a:cubicBezTo>
+              </a:path>
+            </a:pathLst>
+          </a:custGeom>
+          <a:ln w="28575">
+            <a:tailEnd type="arrow"/>
+          </a:ln>
+        </p:spPr>
+        <p:style>
+          <a:lnRef idx="1">
+            <a:schemeClr val="accent1"/>
+          </a:lnRef>
+          <a:fillRef idx="0">
+            <a:schemeClr val="accent1"/>
+          </a:fillRef>
+          <a:effectRef idx="0">
+            <a:schemeClr val="accent1"/>
+          </a:effectRef>
+          <a:fontRef idx="minor">
+            <a:schemeClr val="tx1"/>
+          </a:fontRef>
+        </p:style>
+        <p:txBody>
+          <a:bodyPr rtlCol="0" anchor="ctr"/>
+          <a:lstStyle/>
+          <a:p>
+            <a:pPr algn="ctr"/>
+            <a:endParaRPr lang="en-NL"/>
+          </a:p>
+        </p:txBody>
+      </p:sp>
+      <p:cxnSp>
+        <p:nvCxnSpPr>
+          <p:cNvPr id="23" name="Straight Arrow Connector 22">
+            <a:extLst>
+              <a:ext uri="{FF2B5EF4-FFF2-40B4-BE49-F238E27FC236}">
+                <a16:creationId xmlns:a16="http://schemas.microsoft.com/office/drawing/2014/main" id="{DE68D467-ED7F-43AD-998D-2CDED55B3E0F}"/>
+              </a:ext>
+            </a:extLst>
+          </p:cNvPr>
+          <p:cNvCxnSpPr>
+            <a:cxnSpLocks/>
+            <a:endCxn id="60" idx="1"/>
+          </p:cNvCxnSpPr>
+          <p:nvPr/>
+        </p:nvCxnSpPr>
+        <p:spPr>
+          <a:xfrm>
+            <a:off x="4594247" y="3020350"/>
+            <a:ext cx="1273462" cy="1060409"/>
+          </a:xfrm>
+          <a:prstGeom prst="straightConnector1">
+            <a:avLst/>
+          </a:prstGeom>
+          <a:ln w="28575">
+            <a:tailEnd type="arrow"/>
+          </a:ln>
+        </p:spPr>
+        <p:style>
+          <a:lnRef idx="1">
+            <a:schemeClr val="accent1"/>
+          </a:lnRef>
+          <a:fillRef idx="0">
+            <a:schemeClr val="accent1"/>
+          </a:fillRef>
+          <a:effectRef idx="0">
+            <a:schemeClr val="accent1"/>
+          </a:effectRef>
+          <a:fontRef idx="minor">
+            <a:schemeClr val="tx1"/>
+          </a:fontRef>
+        </p:style>
+      </p:cxnSp>
+      <p:sp>
+        <p:nvSpPr>
+          <p:cNvPr id="28" name="TextBox 27">
+            <a:extLst>
+              <a:ext uri="{FF2B5EF4-FFF2-40B4-BE49-F238E27FC236}">
+                <a16:creationId xmlns:a16="http://schemas.microsoft.com/office/drawing/2014/main" id="{61D0C5E8-1675-44CA-B02A-E63DF40B2550}"/>
+              </a:ext>
+            </a:extLst>
+          </p:cNvPr>
+          <p:cNvSpPr txBox="1"/>
+          <p:nvPr/>
+        </p:nvSpPr>
+        <p:spPr>
+          <a:xfrm rot="2293146">
+            <a:off x="4431333" y="3446286"/>
+            <a:ext cx="1504899" cy="369332"/>
+          </a:xfrm>
+          <a:prstGeom prst="rect">
+            <a:avLst/>
+          </a:prstGeom>
+          <a:noFill/>
+        </p:spPr>
+        <p:txBody>
+          <a:bodyPr wrap="none" rtlCol="0">
+            <a:spAutoFit/>
+          </a:bodyPr>
+          <a:lstStyle/>
+          <a:p>
+            <a:r>
+              <a:rPr lang="nl-NL" dirty="0" err="1"/>
+              <a:t>Reload</a:t>
+            </a:r>
+            <a:r>
+              <a:rPr lang="nl-NL" dirty="0"/>
+              <a:t> trigger</a:t>
+            </a:r>
+            <a:endParaRPr lang="en-NL" dirty="0"/>
+          </a:p>
+        </p:txBody>
+      </p:sp>
+    </p:spTree>
+    <p:extLst>
+      <p:ext uri="{BB962C8B-B14F-4D97-AF65-F5344CB8AC3E}">
+        <p14:creationId xmlns:p14="http://schemas.microsoft.com/office/powerpoint/2010/main" val="809057392"/>
       </p:ext>
     </p:extLst>
   </p:cSld>

</xml_diff>